<commit_message>
Code for MIMIC NLP assignment.
</commit_message>
<xml_diff>
--- a/MIMIC_NLP_Assignemnt_ppt.pptx
+++ b/MIMIC_NLP_Assignemnt_ppt.pptx
@@ -4398,6 +4398,10 @@
               <a:rPr lang="en-US" sz="3600" dirty="0"/>
               <a:t> link</a:t>
             </a:r>
+            <a:br>
+              <a:rPr lang="en-US" sz="3600" dirty="0"/>
+            </a:br>
+            <a:endParaRPr lang="en-US" sz="3600" dirty="0"/>
           </a:p>
         </p:txBody>
       </p:sp>
@@ -4436,32 +4440,20 @@
               <a:rPr lang="en-US" dirty="0">
                 <a:hlinkClick r:id="rId2"/>
               </a:rPr>
-              <a:t>https://</a:t>
-            </a:r>
-            <a:r>
-              <a:rPr lang="en-US" dirty="0" err="1">
-                <a:hlinkClick r:id="rId2"/>
-              </a:rPr>
-              <a:t>github.com</a:t>
-            </a:r>
-            <a:r>
-              <a:rPr lang="en-US" dirty="0">
-                <a:hlinkClick r:id="rId2"/>
-              </a:rPr>
-              <a:t>/</a:t>
-            </a:r>
-            <a:r>
-              <a:rPr lang="en-US" dirty="0" err="1">
-                <a:hlinkClick r:id="rId2"/>
-              </a:rPr>
-              <a:t>akshayuta</a:t>
-            </a:r>
-            <a:r>
-              <a:rPr lang="en-US" dirty="0">
-                <a:hlinkClick r:id="rId2"/>
-              </a:rPr>
-              <a:t>/MIMIC_NLP</a:t>
-            </a:r>
+              <a:t>https://github.com/akshayuta/MIMIC_NLP</a:t>
+            </a:r>
+            <a:endParaRPr lang="en-US" dirty="0"/>
+          </a:p>
+          <a:p>
+            <a:pPr marL="0" indent="0">
+              <a:buNone/>
+            </a:pPr>
+            <a:endParaRPr lang="en-US" dirty="0"/>
+          </a:p>
+          <a:p>
+            <a:pPr marL="0" indent="0">
+              <a:buNone/>
+            </a:pPr>
             <a:endParaRPr lang="en-US" dirty="0"/>
           </a:p>
         </p:txBody>
@@ -4563,7 +4555,7 @@
         <p:spPr>
           <a:xfrm>
             <a:off x="1222745" y="988828"/>
-            <a:ext cx="4540102" cy="369332"/>
+            <a:ext cx="10533826" cy="646331"/>
           </a:xfrm>
           <a:prstGeom prst="rect">
             <a:avLst/>
@@ -4583,6 +4575,40 @@
                 </a:solidFill>
               </a:rPr>
               <a:t>Extract_notes.ipynb</a:t>
+            </a:r>
+            <a:endParaRPr lang="en-US" b="1" dirty="0">
+              <a:solidFill>
+                <a:srgbClr val="0070C0"/>
+              </a:solidFill>
+            </a:endParaRPr>
+          </a:p>
+          <a:p>
+            <a:r>
+              <a:rPr lang="en-US" b="1" dirty="0">
+                <a:solidFill>
+                  <a:srgbClr val="0070C0"/>
+                </a:solidFill>
+                <a:hlinkClick r:id="rId2"/>
+              </a:rPr>
+              <a:t>https://</a:t>
+            </a:r>
+            <a:r>
+              <a:rPr lang="en-US" b="1" dirty="0" err="1">
+                <a:solidFill>
+                  <a:srgbClr val="0070C0"/>
+                </a:solidFill>
+                <a:hlinkClick r:id="rId2"/>
+              </a:rPr>
+              <a:t>colab.research.google.com</a:t>
+            </a:r>
+            <a:r>
+              <a:rPr lang="en-US" b="1" dirty="0">
+                <a:solidFill>
+                  <a:srgbClr val="0070C0"/>
+                </a:solidFill>
+                <a:hlinkClick r:id="rId2"/>
+              </a:rPr>
+              <a:t>/drive/1SCzxSBgcyzsaD8oLUruKOfZgH8OFw3u4?usp=sharing</a:t>
             </a:r>
             <a:endParaRPr lang="en-US" b="1" dirty="0">
               <a:solidFill>
@@ -4852,7 +4878,7 @@
         <p:spPr>
           <a:xfrm>
             <a:off x="1222745" y="988828"/>
-            <a:ext cx="4540102" cy="369332"/>
+            <a:ext cx="9983320" cy="923330"/>
           </a:xfrm>
           <a:prstGeom prst="rect">
             <a:avLst/>
@@ -4872,6 +4898,40 @@
                 </a:solidFill>
               </a:rPr>
               <a:t>Spacy_NLP.ipynb</a:t>
+            </a:r>
+            <a:endParaRPr lang="en-US" b="1" dirty="0">
+              <a:solidFill>
+                <a:srgbClr val="0070C0"/>
+              </a:solidFill>
+            </a:endParaRPr>
+          </a:p>
+          <a:p>
+            <a:r>
+              <a:rPr lang="en-US" b="1" dirty="0">
+                <a:solidFill>
+                  <a:srgbClr val="0070C0"/>
+                </a:solidFill>
+                <a:hlinkClick r:id="rId2"/>
+              </a:rPr>
+              <a:t>https://</a:t>
+            </a:r>
+            <a:r>
+              <a:rPr lang="en-US" b="1" dirty="0" err="1">
+                <a:solidFill>
+                  <a:srgbClr val="0070C0"/>
+                </a:solidFill>
+                <a:hlinkClick r:id="rId2"/>
+              </a:rPr>
+              <a:t>colab.research.google.com</a:t>
+            </a:r>
+            <a:r>
+              <a:rPr lang="en-US" b="1" dirty="0">
+                <a:solidFill>
+                  <a:srgbClr val="0070C0"/>
+                </a:solidFill>
+                <a:hlinkClick r:id="rId2"/>
+              </a:rPr>
+              <a:t>/drive/1gZnydQV1C_BCPV0sVhUP1kzgntYTrNTN?usp=sharing</a:t>
             </a:r>
             <a:endParaRPr lang="en-US" b="1" dirty="0">
               <a:solidFill>
@@ -5266,8 +5326,8 @@
         </p:nvSpPr>
         <p:spPr>
           <a:xfrm>
-            <a:off x="1222745" y="988828"/>
-            <a:ext cx="4540102" cy="369332"/>
+            <a:off x="1222744" y="988828"/>
+            <a:ext cx="9918007" cy="923330"/>
           </a:xfrm>
           <a:prstGeom prst="rect">
             <a:avLst/>
@@ -5294,6 +5354,40 @@
               </a:solidFill>
             </a:endParaRPr>
           </a:p>
+          <a:p>
+            <a:r>
+              <a:rPr lang="en-US" b="1" dirty="0">
+                <a:solidFill>
+                  <a:srgbClr val="0070C0"/>
+                </a:solidFill>
+                <a:hlinkClick r:id="rId2"/>
+              </a:rPr>
+              <a:t>https://</a:t>
+            </a:r>
+            <a:r>
+              <a:rPr lang="en-US" b="1" dirty="0" err="1">
+                <a:solidFill>
+                  <a:srgbClr val="0070C0"/>
+                </a:solidFill>
+                <a:hlinkClick r:id="rId2"/>
+              </a:rPr>
+              <a:t>colab.research.google.com</a:t>
+            </a:r>
+            <a:r>
+              <a:rPr lang="en-US" b="1" dirty="0">
+                <a:solidFill>
+                  <a:srgbClr val="0070C0"/>
+                </a:solidFill>
+                <a:hlinkClick r:id="rId2"/>
+              </a:rPr>
+              <a:t>/drive/1Ulo0Qf5ZQMTGeFoPLaPbwWOFOeAAn96i?usp=sharing</a:t>
+            </a:r>
+            <a:endParaRPr lang="en-US" b="1" dirty="0">
+              <a:solidFill>
+                <a:srgbClr val="0070C0"/>
+              </a:solidFill>
+            </a:endParaRPr>
+          </a:p>
         </p:txBody>
       </p:sp>
       <p:sp>
@@ -5310,7 +5404,7 @@
         </p:nvSpPr>
         <p:spPr>
           <a:xfrm>
-            <a:off x="1222744" y="1786269"/>
+            <a:off x="1120107" y="1983248"/>
             <a:ext cx="7347098" cy="646331"/>
           </a:xfrm>
           <a:prstGeom prst="rect">
@@ -5571,8 +5665,8 @@
         </p:nvSpPr>
         <p:spPr>
           <a:xfrm>
-            <a:off x="1222745" y="988828"/>
-            <a:ext cx="4540102" cy="369332"/>
+            <a:off x="1222744" y="988828"/>
+            <a:ext cx="10398641" cy="923330"/>
           </a:xfrm>
           <a:prstGeom prst="rect">
             <a:avLst/>
@@ -5593,6 +5687,40 @@
               </a:rPr>
               <a:t>Word2vec_tsne_NLP.ipynb</a:t>
             </a:r>
+          </a:p>
+          <a:p>
+            <a:r>
+              <a:rPr lang="en-US" b="1" dirty="0">
+                <a:solidFill>
+                  <a:srgbClr val="0070C0"/>
+                </a:solidFill>
+                <a:hlinkClick r:id="rId2"/>
+              </a:rPr>
+              <a:t>https://</a:t>
+            </a:r>
+            <a:r>
+              <a:rPr lang="en-US" b="1" dirty="0" err="1">
+                <a:solidFill>
+                  <a:srgbClr val="0070C0"/>
+                </a:solidFill>
+                <a:hlinkClick r:id="rId2"/>
+              </a:rPr>
+              <a:t>colab.research.google.com</a:t>
+            </a:r>
+            <a:r>
+              <a:rPr lang="en-US" b="1" dirty="0">
+                <a:solidFill>
+                  <a:srgbClr val="0070C0"/>
+                </a:solidFill>
+                <a:hlinkClick r:id="rId2"/>
+              </a:rPr>
+              <a:t>/drive/1BmfOeOaVUDVcaG7HOZzixCDtiMZ_qUhm?usp=sharing</a:t>
+            </a:r>
+            <a:endParaRPr lang="en-US" b="1" dirty="0">
+              <a:solidFill>
+                <a:srgbClr val="0070C0"/>
+              </a:solidFill>
+            </a:endParaRPr>
           </a:p>
         </p:txBody>
       </p:sp>
@@ -5920,8 +6048,8 @@
         </p:nvSpPr>
         <p:spPr>
           <a:xfrm>
-            <a:off x="1222745" y="988828"/>
-            <a:ext cx="4540102" cy="369332"/>
+            <a:off x="1222744" y="988828"/>
+            <a:ext cx="9862023" cy="923330"/>
           </a:xfrm>
           <a:prstGeom prst="rect">
             <a:avLst/>
@@ -5941,6 +6069,40 @@
                 </a:solidFill>
               </a:rPr>
               <a:t>Other_NLP_tools.ipynb</a:t>
+            </a:r>
+            <a:endParaRPr lang="en-US" b="1" dirty="0">
+              <a:solidFill>
+                <a:srgbClr val="0070C0"/>
+              </a:solidFill>
+            </a:endParaRPr>
+          </a:p>
+          <a:p>
+            <a:r>
+              <a:rPr lang="en-US" b="1" dirty="0">
+                <a:solidFill>
+                  <a:srgbClr val="0070C0"/>
+                </a:solidFill>
+                <a:hlinkClick r:id="rId2"/>
+              </a:rPr>
+              <a:t>https://</a:t>
+            </a:r>
+            <a:r>
+              <a:rPr lang="en-US" b="1" dirty="0" err="1">
+                <a:solidFill>
+                  <a:srgbClr val="0070C0"/>
+                </a:solidFill>
+                <a:hlinkClick r:id="rId2"/>
+              </a:rPr>
+              <a:t>colab.research.google.com</a:t>
+            </a:r>
+            <a:r>
+              <a:rPr lang="en-US" b="1" dirty="0">
+                <a:solidFill>
+                  <a:srgbClr val="0070C0"/>
+                </a:solidFill>
+                <a:hlinkClick r:id="rId2"/>
+              </a:rPr>
+              <a:t>/drive/1Iza_W40ctVmhGKIC56_yfDwNaQinEmtj?usp=sharing</a:t>
             </a:r>
             <a:endParaRPr lang="en-US" b="1" dirty="0">
               <a:solidFill>

</xml_diff>